<commit_message>
Weighted the bin rescaling in preprocessing
</commit_message>
<xml_diff>
--- a/fig_FSE.pptx
+++ b/fig_FSE.pptx
@@ -126,7 +126,7 @@
 <file path=ppt/revisionInfo.xml><?xml version="1.0" encoding="utf-8"?>
 <p1510:revInfo xmlns:a="http://schemas.openxmlformats.org/drawingml/2006/main" xmlns:r="http://schemas.openxmlformats.org/officeDocument/2006/relationships" xmlns:p1510="http://schemas.microsoft.com/office/powerpoint/2015/10/main">
   <p1510:revLst>
-    <p1510:client id="{F19F6765-F9C2-2F4B-B759-1DC0051C5417}" v="29" dt="2025-05-05T18:56:06.080"/>
+    <p1510:client id="{F19F6765-F9C2-2F4B-B759-1DC0051C5417}" v="30" dt="2025-05-05T22:06:30.662"/>
   </p1510:revLst>
 </p1510:revInfo>
 </file>
@@ -136,12 +136,12 @@
   <pc:docChgLst>
     <pc:chgData name="Barkasi, Michael" userId="604489e9-c8b5-4a18-ae0d-3a3e29c44efc" providerId="ADAL" clId="{F19F6765-F9C2-2F4B-B759-1DC0051C5417}"/>
     <pc:docChg chg="undo custSel modSld">
-      <pc:chgData name="Barkasi, Michael" userId="604489e9-c8b5-4a18-ae0d-3a3e29c44efc" providerId="ADAL" clId="{F19F6765-F9C2-2F4B-B759-1DC0051C5417}" dt="2025-05-05T18:56:18.864" v="194" actId="1076"/>
+      <pc:chgData name="Barkasi, Michael" userId="604489e9-c8b5-4a18-ae0d-3a3e29c44efc" providerId="ADAL" clId="{F19F6765-F9C2-2F4B-B759-1DC0051C5417}" dt="2025-05-05T22:08:06.706" v="238" actId="1076"/>
       <pc:docMkLst>
         <pc:docMk/>
       </pc:docMkLst>
       <pc:sldChg chg="addSp delSp modSp mod">
-        <pc:chgData name="Barkasi, Michael" userId="604489e9-c8b5-4a18-ae0d-3a3e29c44efc" providerId="ADAL" clId="{F19F6765-F9C2-2F4B-B759-1DC0051C5417}" dt="2025-05-05T18:56:18.864" v="194" actId="1076"/>
+        <pc:chgData name="Barkasi, Michael" userId="604489e9-c8b5-4a18-ae0d-3a3e29c44efc" providerId="ADAL" clId="{F19F6765-F9C2-2F4B-B759-1DC0051C5417}" dt="2025-05-05T22:08:06.706" v="238" actId="1076"/>
         <pc:sldMkLst>
           <pc:docMk/>
           <pc:sldMk cId="1160241537" sldId="256"/>
@@ -179,7 +179,7 @@
           </ac:spMkLst>
         </pc:spChg>
         <pc:spChg chg="mod topLvl">
-          <ac:chgData name="Barkasi, Michael" userId="604489e9-c8b5-4a18-ae0d-3a3e29c44efc" providerId="ADAL" clId="{F19F6765-F9C2-2F4B-B759-1DC0051C5417}" dt="2025-05-05T18:47:58.163" v="38" actId="2711"/>
+          <ac:chgData name="Barkasi, Michael" userId="604489e9-c8b5-4a18-ae0d-3a3e29c44efc" providerId="ADAL" clId="{F19F6765-F9C2-2F4B-B759-1DC0051C5417}" dt="2025-05-05T22:08:00.871" v="236" actId="1076"/>
           <ac:spMkLst>
             <pc:docMk/>
             <pc:sldMk cId="1160241537" sldId="256"/>
@@ -195,7 +195,7 @@
           </ac:spMkLst>
         </pc:spChg>
         <pc:spChg chg="add mod">
-          <ac:chgData name="Barkasi, Michael" userId="604489e9-c8b5-4a18-ae0d-3a3e29c44efc" providerId="ADAL" clId="{F19F6765-F9C2-2F4B-B759-1DC0051C5417}" dt="2025-05-05T18:48:03.552" v="39" actId="2711"/>
+          <ac:chgData name="Barkasi, Michael" userId="604489e9-c8b5-4a18-ae0d-3a3e29c44efc" providerId="ADAL" clId="{F19F6765-F9C2-2F4B-B759-1DC0051C5417}" dt="2025-05-05T22:08:00.871" v="236" actId="1076"/>
           <ac:spMkLst>
             <pc:docMk/>
             <pc:sldMk cId="1160241537" sldId="256"/>
@@ -211,7 +211,7 @@
           </ac:spMkLst>
         </pc:spChg>
         <pc:spChg chg="add mod">
-          <ac:chgData name="Barkasi, Michael" userId="604489e9-c8b5-4a18-ae0d-3a3e29c44efc" providerId="ADAL" clId="{F19F6765-F9C2-2F4B-B759-1DC0051C5417}" dt="2025-05-05T18:49:18.258" v="76" actId="1076"/>
+          <ac:chgData name="Barkasi, Michael" userId="604489e9-c8b5-4a18-ae0d-3a3e29c44efc" providerId="ADAL" clId="{F19F6765-F9C2-2F4B-B759-1DC0051C5417}" dt="2025-05-05T22:08:03.919" v="237" actId="1076"/>
           <ac:spMkLst>
             <pc:docMk/>
             <pc:sldMk cId="1160241537" sldId="256"/>
@@ -219,7 +219,7 @@
           </ac:spMkLst>
         </pc:spChg>
         <pc:spChg chg="add mod">
-          <ac:chgData name="Barkasi, Michael" userId="604489e9-c8b5-4a18-ae0d-3a3e29c44efc" providerId="ADAL" clId="{F19F6765-F9C2-2F4B-B759-1DC0051C5417}" dt="2025-05-05T18:49:21.855" v="77" actId="1076"/>
+          <ac:chgData name="Barkasi, Michael" userId="604489e9-c8b5-4a18-ae0d-3a3e29c44efc" providerId="ADAL" clId="{F19F6765-F9C2-2F4B-B759-1DC0051C5417}" dt="2025-05-05T22:08:06.706" v="238" actId="1076"/>
           <ac:spMkLst>
             <pc:docMk/>
             <pc:sldMk cId="1160241537" sldId="256"/>
@@ -259,7 +259,7 @@
           </ac:spMkLst>
         </pc:spChg>
         <pc:spChg chg="add mod">
-          <ac:chgData name="Barkasi, Michael" userId="604489e9-c8b5-4a18-ae0d-3a3e29c44efc" providerId="ADAL" clId="{F19F6765-F9C2-2F4B-B759-1DC0051C5417}" dt="2025-05-05T18:55:22.856" v="179" actId="2085"/>
+          <ac:chgData name="Barkasi, Michael" userId="604489e9-c8b5-4a18-ae0d-3a3e29c44efc" providerId="ADAL" clId="{F19F6765-F9C2-2F4B-B759-1DC0051C5417}" dt="2025-05-05T22:07:37.363" v="233" actId="1076"/>
           <ac:spMkLst>
             <pc:docMk/>
             <pc:sldMk cId="1160241537" sldId="256"/>
@@ -267,7 +267,7 @@
           </ac:spMkLst>
         </pc:spChg>
         <pc:spChg chg="add mod">
-          <ac:chgData name="Barkasi, Michael" userId="604489e9-c8b5-4a18-ae0d-3a3e29c44efc" providerId="ADAL" clId="{F19F6765-F9C2-2F4B-B759-1DC0051C5417}" dt="2025-05-05T18:55:43.398" v="183" actId="1076"/>
+          <ac:chgData name="Barkasi, Michael" userId="604489e9-c8b5-4a18-ae0d-3a3e29c44efc" providerId="ADAL" clId="{F19F6765-F9C2-2F4B-B759-1DC0051C5417}" dt="2025-05-05T22:07:40.584" v="234" actId="1076"/>
           <ac:spMkLst>
             <pc:docMk/>
             <pc:sldMk cId="1160241537" sldId="256"/>
@@ -275,11 +275,19 @@
           </ac:spMkLst>
         </pc:spChg>
         <pc:spChg chg="add mod">
-          <ac:chgData name="Barkasi, Michael" userId="604489e9-c8b5-4a18-ae0d-3a3e29c44efc" providerId="ADAL" clId="{F19F6765-F9C2-2F4B-B759-1DC0051C5417}" dt="2025-05-05T18:56:18.864" v="194" actId="1076"/>
+          <ac:chgData name="Barkasi, Michael" userId="604489e9-c8b5-4a18-ae0d-3a3e29c44efc" providerId="ADAL" clId="{F19F6765-F9C2-2F4B-B759-1DC0051C5417}" dt="2025-05-05T22:07:37.363" v="233" actId="1076"/>
           <ac:spMkLst>
             <pc:docMk/>
             <pc:sldMk cId="1160241537" sldId="256"/>
             <ac:spMk id="109" creationId="{C0CECDFC-29DC-9E49-F628-C98AF3712AF1}"/>
+          </ac:spMkLst>
+        </pc:spChg>
+        <pc:spChg chg="add mod">
+          <ac:chgData name="Barkasi, Michael" userId="604489e9-c8b5-4a18-ae0d-3a3e29c44efc" providerId="ADAL" clId="{F19F6765-F9C2-2F4B-B759-1DC0051C5417}" dt="2025-05-05T22:06:51.096" v="232" actId="1076"/>
+          <ac:spMkLst>
+            <pc:docMk/>
+            <pc:sldMk cId="1160241537" sldId="256"/>
+            <ac:spMk id="110" creationId="{DD6AAAD2-9A51-A203-8D3E-39A30D638981}"/>
           </ac:spMkLst>
         </pc:spChg>
         <pc:spChg chg="del">
@@ -355,7 +363,7 @@
           </ac:grpSpMkLst>
         </pc:grpChg>
         <pc:grpChg chg="mod">
-          <ac:chgData name="Barkasi, Michael" userId="604489e9-c8b5-4a18-ae0d-3a3e29c44efc" providerId="ADAL" clId="{F19F6765-F9C2-2F4B-B759-1DC0051C5417}" dt="2025-05-05T18:52:29.765" v="111" actId="1076"/>
+          <ac:chgData name="Barkasi, Michael" userId="604489e9-c8b5-4a18-ae0d-3a3e29c44efc" providerId="ADAL" clId="{F19F6765-F9C2-2F4B-B759-1DC0051C5417}" dt="2025-05-05T22:07:37.363" v="233" actId="1076"/>
           <ac:grpSpMkLst>
             <pc:docMk/>
             <pc:sldMk cId="1160241537" sldId="256"/>
@@ -371,7 +379,7 @@
           </ac:grpSpMkLst>
         </pc:grpChg>
         <pc:grpChg chg="mod">
-          <ac:chgData name="Barkasi, Michael" userId="604489e9-c8b5-4a18-ae0d-3a3e29c44efc" providerId="ADAL" clId="{F19F6765-F9C2-2F4B-B759-1DC0051C5417}" dt="2025-05-05T18:52:33.392" v="112" actId="1076"/>
+          <ac:chgData name="Barkasi, Michael" userId="604489e9-c8b5-4a18-ae0d-3a3e29c44efc" providerId="ADAL" clId="{F19F6765-F9C2-2F4B-B759-1DC0051C5417}" dt="2025-05-05T22:07:37.363" v="233" actId="1076"/>
           <ac:grpSpMkLst>
             <pc:docMk/>
             <pc:sldMk cId="1160241537" sldId="256"/>
@@ -411,7 +419,7 @@
           </ac:picMkLst>
         </pc:picChg>
         <pc:picChg chg="mod topLvl modCrop">
-          <ac:chgData name="Barkasi, Michael" userId="604489e9-c8b5-4a18-ae0d-3a3e29c44efc" providerId="ADAL" clId="{F19F6765-F9C2-2F4B-B759-1DC0051C5417}" dt="2025-05-05T18:46:29.664" v="21" actId="1076"/>
+          <ac:chgData name="Barkasi, Michael" userId="604489e9-c8b5-4a18-ae0d-3a3e29c44efc" providerId="ADAL" clId="{F19F6765-F9C2-2F4B-B759-1DC0051C5417}" dt="2025-05-05T22:08:00.871" v="236" actId="1076"/>
           <ac:picMkLst>
             <pc:docMk/>
             <pc:sldMk cId="1160241537" sldId="256"/>
@@ -419,7 +427,7 @@
           </ac:picMkLst>
         </pc:picChg>
         <pc:picChg chg="add mod modCrop">
-          <ac:chgData name="Barkasi, Michael" userId="604489e9-c8b5-4a18-ae0d-3a3e29c44efc" providerId="ADAL" clId="{F19F6765-F9C2-2F4B-B759-1DC0051C5417}" dt="2025-05-05T18:46:48.580" v="27" actId="1076"/>
+          <ac:chgData name="Barkasi, Michael" userId="604489e9-c8b5-4a18-ae0d-3a3e29c44efc" providerId="ADAL" clId="{F19F6765-F9C2-2F4B-B759-1DC0051C5417}" dt="2025-05-05T22:08:00.871" v="236" actId="1076"/>
           <ac:picMkLst>
             <pc:docMk/>
             <pc:sldMk cId="1160241537" sldId="256"/>
@@ -4045,7 +4053,7 @@
         </p:blipFill>
         <p:spPr>
           <a:xfrm>
-            <a:off x="1454767" y="4094369"/>
+            <a:off x="1903500" y="3510169"/>
             <a:ext cx="560300" cy="670205"/>
           </a:xfrm>
           <a:prstGeom prst="rect">
@@ -4067,7 +4075,7 @@
         </p:nvSpPr>
         <p:spPr>
           <a:xfrm>
-            <a:off x="1237136" y="3763478"/>
+            <a:off x="1685869" y="3179278"/>
             <a:ext cx="1102095" cy="369332"/>
           </a:xfrm>
           <a:prstGeom prst="rect">
@@ -4113,7 +4121,7 @@
         </p:blipFill>
         <p:spPr>
           <a:xfrm>
-            <a:off x="1625600" y="5476068"/>
+            <a:off x="2074333" y="4891868"/>
             <a:ext cx="554004" cy="670205"/>
           </a:xfrm>
           <a:prstGeom prst="rect">
@@ -4135,7 +4143,7 @@
         </p:nvSpPr>
         <p:spPr>
           <a:xfrm>
-            <a:off x="1372602" y="5060512"/>
+            <a:off x="1821335" y="4476312"/>
             <a:ext cx="1102095" cy="369332"/>
           </a:xfrm>
           <a:prstGeom prst="rect">
@@ -4212,7 +4220,7 @@
         </p:nvSpPr>
         <p:spPr>
           <a:xfrm>
-            <a:off x="186266" y="2988733"/>
+            <a:off x="186266" y="3191933"/>
             <a:ext cx="1828801" cy="830997"/>
           </a:xfrm>
           <a:prstGeom prst="rect">
@@ -4250,7 +4258,7 @@
         </p:nvSpPr>
         <p:spPr>
           <a:xfrm>
-            <a:off x="67733" y="4944532"/>
+            <a:off x="169333" y="4817532"/>
             <a:ext cx="1828801" cy="830997"/>
           </a:xfrm>
           <a:prstGeom prst="rect">
@@ -4290,7 +4298,7 @@
         </p:nvGrpSpPr>
         <p:grpSpPr>
           <a:xfrm>
-            <a:off x="4360332" y="3423222"/>
+            <a:off x="5181598" y="3143822"/>
             <a:ext cx="1135211" cy="1063911"/>
             <a:chOff x="3234842" y="2216575"/>
             <a:chExt cx="2918242" cy="2734953"/>
@@ -4840,7 +4848,7 @@
         </p:nvGrpSpPr>
         <p:grpSpPr>
           <a:xfrm>
-            <a:off x="4453465" y="5108089"/>
+            <a:off x="5274731" y="4828689"/>
             <a:ext cx="1135211" cy="1063911"/>
             <a:chOff x="6070599" y="4642422"/>
             <a:chExt cx="1135211" cy="1063911"/>
@@ -5489,7 +5497,7 @@
         </p:nvSpPr>
         <p:spPr>
           <a:xfrm>
-            <a:off x="5791200" y="4047067"/>
+            <a:off x="6612466" y="3767667"/>
             <a:ext cx="279400" cy="1286933"/>
           </a:xfrm>
           <a:prstGeom prst="downArrow">
@@ -5541,7 +5549,7 @@
         </p:nvSpPr>
         <p:spPr>
           <a:xfrm rot="16200000">
-            <a:off x="3124203" y="4102099"/>
+            <a:off x="3539071" y="4025899"/>
             <a:ext cx="571500" cy="918635"/>
           </a:xfrm>
           <a:prstGeom prst="downArrow">
@@ -5598,7 +5606,7 @@
             </p:nvSpPr>
             <p:spPr>
               <a:xfrm>
-                <a:off x="6032500" y="4377267"/>
+                <a:off x="6853766" y="4097867"/>
                 <a:ext cx="310983" cy="492443"/>
               </a:xfrm>
               <a:prstGeom prst="rect">
@@ -5652,7 +5660,7 @@
             </p:nvSpPr>
             <p:spPr>
               <a:xfrm>
-                <a:off x="6032500" y="4377267"/>
+                <a:off x="6853766" y="4097867"/>
                 <a:ext cx="310983" cy="492443"/>
               </a:xfrm>
               <a:prstGeom prst="rect">
@@ -5661,7 +5669,7 @@
               <a:blipFill>
                 <a:blip r:embed="rId7"/>
                 <a:stretch>
-                  <a:fillRect l="-48000" r="-44000" b="-32500"/>
+                  <a:fillRect l="-44000" r="-48000" b="-32500"/>
                 </a:stretch>
               </a:blipFill>
             </p:spPr>
@@ -5680,6 +5688,44 @@
           </p:sp>
         </mc:Fallback>
       </mc:AlternateContent>
+      <p:sp>
+        <p:nvSpPr>
+          <p:cNvPr id="110" name="TextBox 109">
+            <a:extLst>
+              <a:ext uri="{FF2B5EF4-FFF2-40B4-BE49-F238E27FC236}">
+                <a16:creationId xmlns:a16="http://schemas.microsoft.com/office/drawing/2014/main" id="{DD6AAAD2-9A51-A203-8D3E-39A30D638981}"/>
+              </a:ext>
+            </a:extLst>
+          </p:cNvPr>
+          <p:cNvSpPr txBox="1"/>
+          <p:nvPr/>
+        </p:nvSpPr>
+        <p:spPr>
+          <a:xfrm>
+            <a:off x="8915400" y="457199"/>
+            <a:ext cx="3115734" cy="1200329"/>
+          </a:xfrm>
+          <a:prstGeom prst="rect">
+            <a:avLst/>
+          </a:prstGeom>
+          <a:noFill/>
+        </p:spPr>
+        <p:txBody>
+          <a:bodyPr wrap="square" rtlCol="0">
+            <a:spAutoFit/>
+          </a:bodyPr>
+          <a:lstStyle/>
+          <a:p>
+            <a:r>
+              <a:rPr lang="en-US" sz="2400" dirty="0">
+                <a:latin typeface="Arial" panose="020B0604020202020204" pitchFamily="34" charset="0"/>
+                <a:cs typeface="Arial" panose="020B0604020202020204" pitchFamily="34" charset="0"/>
+              </a:rPr>
+              <a:t>Biological or Cognitive Functioning</a:t>
+            </a:r>
+          </a:p>
+        </p:txBody>
+      </p:sp>
     </p:spTree>
     <p:extLst>
       <p:ext uri="{BB962C8B-B14F-4D97-AF65-F5344CB8AC3E}">

</xml_diff>